<commit_message>
splitting the data json in esssse
</commit_message>
<xml_diff>
--- a/presentations/Electric Force/Electric Force.pptx
+++ b/presentations/Electric Force/Electric Force.pptx
@@ -17,17 +17,18 @@
     <p:sldId id="265" r:id="rId15"/>
     <p:sldId id="266" r:id="rId16"/>
     <p:sldId id="267" r:id="rId17"/>
+    <p:sldId id="268" r:id="rId18"/>
   </p:sldIdLst>
   <p:sldSz cx="18288000" cy="10287000"/>
   <p:notesSz cx="6858000" cy="9144000"/>
   <p:embeddedFontLst>
     <p:embeddedFont>
       <p:font typeface="Graffitica" charset="1" panose="00000500000000000000"/>
-      <p:regular r:id="rId18"/>
+      <p:regular r:id="rId19"/>
     </p:embeddedFont>
     <p:embeddedFont>
       <p:font typeface="Markazi Text Bold" charset="1" panose="00000800000000000000"/>
-      <p:regular r:id="rId19"/>
+      <p:regular r:id="rId20"/>
     </p:embeddedFont>
   </p:embeddedFontLst>
   <p:defaultTextStyle>
@@ -4368,8 +4369,8 @@
         </p:nvSpPr>
         <p:spPr>
           <a:xfrm flipH="false" flipV="false" rot="0">
-            <a:off x="490151" y="166745"/>
-            <a:ext cx="17387158" cy="10034530"/>
+            <a:off x="284806" y="-28575"/>
+            <a:ext cx="17797849" cy="10278485"/>
           </a:xfrm>
           <a:custGeom>
             <a:avLst/>
@@ -4378,18 +4379,18 @@
             <a:cxnLst/>
             <a:rect r="r" b="b" t="t" l="l"/>
             <a:pathLst>
-              <a:path h="10034530" w="17387158">
+              <a:path h="10278485" w="17797849">
                 <a:moveTo>
                   <a:pt x="0" y="0"/>
                 </a:moveTo>
                 <a:lnTo>
-                  <a:pt x="17387158" y="0"/>
-                </a:lnTo>
-                <a:lnTo>
-                  <a:pt x="17387158" y="10034530"/>
-                </a:lnTo>
-                <a:lnTo>
-                  <a:pt x="0" y="10034530"/>
+                  <a:pt x="17797849" y="0"/>
+                </a:lnTo>
+                <a:lnTo>
+                  <a:pt x="17797849" y="10278485"/>
+                </a:lnTo>
+                <a:lnTo>
+                  <a:pt x="0" y="10278485"/>
                 </a:lnTo>
                 <a:lnTo>
                   <a:pt x="0" y="0"/>
@@ -4417,9 +4418,6 @@
   <p:clrMapOvr>
     <a:masterClrMapping/>
   </p:clrMapOvr>
-  <p:transition spd="fast">
-    <p:push dir="l"/>
-  </p:transition>
 </p:sld>
 </file>
 
@@ -4448,8 +4446,8 @@
         </p:nvSpPr>
         <p:spPr>
           <a:xfrm flipH="false" flipV="false" rot="0">
-            <a:off x="490151" y="166745"/>
-            <a:ext cx="17387158" cy="10034530"/>
+            <a:off x="284806" y="-28575"/>
+            <a:ext cx="17797849" cy="10278485"/>
           </a:xfrm>
           <a:custGeom>
             <a:avLst/>
@@ -4458,18 +4456,18 @@
             <a:cxnLst/>
             <a:rect r="r" b="b" t="t" l="l"/>
             <a:pathLst>
-              <a:path h="10034530" w="17387158">
+              <a:path h="10278485" w="17797849">
                 <a:moveTo>
                   <a:pt x="0" y="0"/>
                 </a:moveTo>
                 <a:lnTo>
-                  <a:pt x="17387158" y="0"/>
-                </a:lnTo>
-                <a:lnTo>
-                  <a:pt x="17387158" y="10034530"/>
-                </a:lnTo>
-                <a:lnTo>
-                  <a:pt x="0" y="10034530"/>
+                  <a:pt x="17797849" y="0"/>
+                </a:lnTo>
+                <a:lnTo>
+                  <a:pt x="17797849" y="10278485"/>
+                </a:lnTo>
+                <a:lnTo>
+                  <a:pt x="0" y="10278485"/>
                 </a:lnTo>
                 <a:lnTo>
                   <a:pt x="0" y="0"/>
@@ -4497,13 +4495,87 @@
   <p:clrMapOvr>
     <a:masterClrMapping/>
   </p:clrMapOvr>
-  <p:transition spd="fast">
-    <p:push dir="l"/>
-  </p:transition>
 </p:sld>
 </file>
 
 <file path=ppt/slides/slide12.xml><?xml version="1.0" encoding="utf-8"?>
+<p:sld xmlns:p="http://schemas.openxmlformats.org/presentationml/2006/main" xmlns:a="http://schemas.openxmlformats.org/drawingml/2006/main" xmlns:r="http://schemas.openxmlformats.org/officeDocument/2006/relationships">
+  <p:cSld>
+    <p:spTree>
+      <p:nvGrpSpPr>
+        <p:cNvPr id="1" name=""/>
+        <p:cNvGrpSpPr/>
+        <p:nvPr/>
+      </p:nvGrpSpPr>
+      <p:grpSpPr>
+        <a:xfrm>
+          <a:off x="0" y="0"/>
+          <a:ext cx="0" cy="0"/>
+          <a:chOff x="0" y="0"/>
+          <a:chExt cx="0" cy="0"/>
+        </a:xfrm>
+      </p:grpSpPr>
+      <p:sp>
+        <p:nvSpPr>
+          <p:cNvPr name="Freeform 2" id="2"/>
+          <p:cNvSpPr/>
+          <p:nvPr/>
+        </p:nvSpPr>
+        <p:spPr>
+          <a:xfrm flipH="false" flipV="false" rot="0">
+            <a:off x="351672" y="45912"/>
+            <a:ext cx="17584656" cy="10155363"/>
+          </a:xfrm>
+          <a:custGeom>
+            <a:avLst/>
+            <a:gdLst/>
+            <a:ahLst/>
+            <a:cxnLst/>
+            <a:rect r="r" b="b" t="t" l="l"/>
+            <a:pathLst>
+              <a:path h="10155363" w="17584656">
+                <a:moveTo>
+                  <a:pt x="0" y="0"/>
+                </a:moveTo>
+                <a:lnTo>
+                  <a:pt x="17584656" y="0"/>
+                </a:lnTo>
+                <a:lnTo>
+                  <a:pt x="17584656" y="10155363"/>
+                </a:lnTo>
+                <a:lnTo>
+                  <a:pt x="0" y="10155363"/>
+                </a:lnTo>
+                <a:lnTo>
+                  <a:pt x="0" y="0"/>
+                </a:lnTo>
+                <a:close/>
+              </a:path>
+            </a:pathLst>
+          </a:custGeom>
+          <a:blipFill>
+            <a:blip r:embed="rId2">
+              <a:extLst>
+                <a:ext uri="{96DAC541-7B7A-43D3-8B79-37D633B846F1}">
+                  <asvg:svgBlip xmlns:asvg="http://schemas.microsoft.com/office/drawing/2016/SVG/main" r:embed="rId3"/>
+                </a:ext>
+              </a:extLst>
+            </a:blip>
+            <a:stretch>
+              <a:fillRect l="0" t="0" r="0" b="0"/>
+            </a:stretch>
+          </a:blipFill>
+        </p:spPr>
+      </p:sp>
+    </p:spTree>
+  </p:cSld>
+  <p:clrMapOvr>
+    <a:masterClrMapping/>
+  </p:clrMapOvr>
+</p:sld>
+</file>
+
+<file path=ppt/slides/slide13.xml><?xml version="1.0" encoding="utf-8"?>
 <p:sld xmlns:p="http://schemas.openxmlformats.org/presentationml/2006/main" xmlns:a="http://schemas.openxmlformats.org/drawingml/2006/main" xmlns:r="http://schemas.openxmlformats.org/officeDocument/2006/relationships">
   <p:cSld>
     <p:spTree>
@@ -5409,7 +5481,7 @@
         </p:nvSpPr>
         <p:spPr>
           <a:xfrm rot="0">
-            <a:off x="0" y="4196137"/>
+            <a:off x="0" y="4367587"/>
             <a:ext cx="18288000" cy="2762951"/>
           </a:xfrm>
           <a:prstGeom prst="rect">
@@ -5438,25 +5510,81 @@
                 <a:sym typeface="Graffitica"/>
                 <a:rtl val="true"/>
               </a:rPr>
-              <a:t>شكرًا  لكم !</a:t>
+              <a:t>شكرًا  لكم</a:t>
             </a:r>
           </a:p>
         </p:txBody>
+      </p:sp>
+      <p:sp>
+        <p:nvSpPr>
+          <p:cNvPr name="Freeform 19" id="19"/>
+          <p:cNvSpPr/>
+          <p:nvPr/>
+        </p:nvSpPr>
+        <p:spPr>
+          <a:xfrm flipH="false" flipV="false" rot="-494342">
+            <a:off x="3925056" y="3667565"/>
+            <a:ext cx="1429234" cy="1485971"/>
+          </a:xfrm>
+          <a:custGeom>
+            <a:avLst/>
+            <a:gdLst/>
+            <a:ahLst/>
+            <a:cxnLst/>
+            <a:rect r="r" b="b" t="t" l="l"/>
+            <a:pathLst>
+              <a:path h="1485971" w="1429234">
+                <a:moveTo>
+                  <a:pt x="0" y="0"/>
+                </a:moveTo>
+                <a:lnTo>
+                  <a:pt x="1429234" y="0"/>
+                </a:lnTo>
+                <a:lnTo>
+                  <a:pt x="1429234" y="1485971"/>
+                </a:lnTo>
+                <a:lnTo>
+                  <a:pt x="0" y="1485971"/>
+                </a:lnTo>
+                <a:lnTo>
+                  <a:pt x="0" y="0"/>
+                </a:lnTo>
+                <a:close/>
+              </a:path>
+            </a:pathLst>
+          </a:custGeom>
+          <a:blipFill>
+            <a:blip r:embed="rId31">
+              <a:extLst>
+                <a:ext uri="{96DAC541-7B7A-43D3-8B79-37D633B846F1}">
+                  <asvg:svgBlip xmlns:asvg="http://schemas.microsoft.com/office/drawing/2016/SVG/main" r:embed="rId32"/>
+                </a:ext>
+              </a:extLst>
+            </a:blip>
+            <a:stretch>
+              <a:fillRect l="0" t="0" r="0" b="0"/>
+            </a:stretch>
+          </a:blipFill>
+        </p:spPr>
       </p:sp>
     </p:spTree>
   </p:cSld>
   <p:clrMapOvr>
     <a:masterClrMapping/>
   </p:clrMapOvr>
-  <p:transition spd="fast">
-    <p:push dir="l"/>
-  </p:transition>
 </p:sld>
 </file>
 
 <file path=ppt/slides/slide2.xml><?xml version="1.0" encoding="utf-8"?>
 <p:sld xmlns:p="http://schemas.openxmlformats.org/presentationml/2006/main" xmlns:a="http://schemas.openxmlformats.org/drawingml/2006/main" xmlns:r="http://schemas.openxmlformats.org/officeDocument/2006/relationships">
   <p:cSld>
+    <p:bg>
+      <p:bgPr>
+        <a:solidFill>
+          <a:srgbClr val="000000"/>
+        </a:solidFill>
+      </p:bgPr>
+    </p:bg>
     <p:spTree>
       <p:nvGrpSpPr>
         <p:cNvPr id="1" name=""/>
@@ -5471,16 +5599,124 @@
           <a:chExt cx="0" cy="0"/>
         </a:xfrm>
       </p:grpSpPr>
-      <p:sp>
-        <p:nvSpPr>
-          <p:cNvPr name="Freeform 2" id="2"/>
+      <p:grpSp>
+        <p:nvGrpSpPr>
+          <p:cNvPr name="Group 2" id="2"/>
+          <p:cNvGrpSpPr>
+            <a:grpSpLocks noChangeAspect="true"/>
+          </p:cNvGrpSpPr>
+          <p:nvPr/>
+        </p:nvGrpSpPr>
+        <p:grpSpPr>
+          <a:xfrm rot="0">
+            <a:off x="2703759" y="-6143893"/>
+            <a:ext cx="12880482" cy="22898635"/>
+            <a:chOff x="0" y="0"/>
+            <a:chExt cx="13716000" cy="24384000"/>
+          </a:xfrm>
+        </p:grpSpPr>
+        <p:sp>
+          <p:nvSpPr>
+            <p:cNvPr name="Freeform 3" id="3"/>
+            <p:cNvSpPr/>
+            <p:nvPr/>
+          </p:nvSpPr>
+          <p:spPr>
+            <a:xfrm flipH="false" flipV="false" rot="0">
+              <a:off x="431800" y="7372350"/>
+              <a:ext cx="12852400" cy="9639300"/>
+            </a:xfrm>
+            <a:custGeom>
+              <a:avLst/>
+              <a:gdLst/>
+              <a:ahLst/>
+              <a:cxnLst/>
+              <a:rect r="r" b="b" t="t" l="l"/>
+              <a:pathLst>
+                <a:path h="9639300" w="12852400">
+                  <a:moveTo>
+                    <a:pt x="12268200" y="9201150"/>
+                  </a:moveTo>
+                  <a:cubicBezTo>
+                    <a:pt x="8373490" y="9639300"/>
+                    <a:pt x="4478909" y="9639300"/>
+                    <a:pt x="584200" y="9201150"/>
+                  </a:cubicBezTo>
+                  <a:cubicBezTo>
+                    <a:pt x="0" y="6280150"/>
+                    <a:pt x="0" y="3359150"/>
+                    <a:pt x="584200" y="438150"/>
+                  </a:cubicBezTo>
+                  <a:cubicBezTo>
+                    <a:pt x="4478909" y="0"/>
+                    <a:pt x="8373491" y="0"/>
+                    <a:pt x="12268200" y="438150"/>
+                  </a:cubicBezTo>
+                  <a:cubicBezTo>
+                    <a:pt x="12852400" y="3359150"/>
+                    <a:pt x="12852400" y="6280150"/>
+                    <a:pt x="12268200" y="9201150"/>
+                  </a:cubicBezTo>
+                  <a:close/>
+                </a:path>
+              </a:pathLst>
+            </a:custGeom>
+            <a:blipFill>
+              <a:blip r:embed="rId2"/>
+              <a:stretch>
+                <a:fillRect l="0" t="0" r="0" b="0"/>
+              </a:stretch>
+            </a:blipFill>
+          </p:spPr>
+        </p:sp>
+        <p:sp>
+          <p:nvSpPr>
+            <p:cNvPr name="Freeform 4" id="4"/>
+            <p:cNvSpPr/>
+            <p:nvPr/>
+          </p:nvSpPr>
+          <p:spPr>
+            <a:xfrm flipH="false" flipV="false" rot="0">
+              <a:off x="0" y="0"/>
+              <a:ext cx="13716000" cy="24384000"/>
+            </a:xfrm>
+            <a:custGeom>
+              <a:avLst/>
+              <a:gdLst/>
+              <a:ahLst/>
+              <a:cxnLst/>
+              <a:rect r="r" b="b" t="t" l="l"/>
+              <a:pathLst>
+                <a:path h="24384000" w="13716000">
+                  <a:moveTo>
+                    <a:pt x="0" y="0"/>
+                  </a:moveTo>
+                  <a:lnTo>
+                    <a:pt x="13716000" y="0"/>
+                  </a:lnTo>
+                  <a:lnTo>
+                    <a:pt x="13716000" y="24384000"/>
+                  </a:lnTo>
+                  <a:lnTo>
+                    <a:pt x="0" y="24384000"/>
+                  </a:lnTo>
+                  <a:close/>
+                </a:path>
+              </a:pathLst>
+            </a:custGeom>
+          </p:spPr>
+        </p:sp>
+      </p:grpSp>
+      <p:sp>
+        <p:nvSpPr>
+          <p:cNvPr name="Freeform 5" id="5"/>
           <p:cNvSpPr/>
           <p:nvPr/>
         </p:nvSpPr>
         <p:spPr>
           <a:xfrm flipH="false" flipV="false" rot="0">
-            <a:off x="430942" y="229987"/>
-            <a:ext cx="17426116" cy="10057013"/>
+            <a:off x="-2329398" y="7844350"/>
+            <a:ext cx="6522928" cy="4451898"/>
           </a:xfrm>
           <a:custGeom>
             <a:avLst/>
@@ -5489,18 +5725,18 @@
             <a:cxnLst/>
             <a:rect r="r" b="b" t="t" l="l"/>
             <a:pathLst>
-              <a:path h="10057013" w="17426116">
+              <a:path h="4451898" w="6522928">
                 <a:moveTo>
                   <a:pt x="0" y="0"/>
                 </a:moveTo>
                 <a:lnTo>
-                  <a:pt x="17426116" y="0"/>
-                </a:lnTo>
-                <a:lnTo>
-                  <a:pt x="17426116" y="10057013"/>
-                </a:lnTo>
-                <a:lnTo>
-                  <a:pt x="0" y="10057013"/>
+                  <a:pt x="6522927" y="0"/>
+                </a:lnTo>
+                <a:lnTo>
+                  <a:pt x="6522927" y="4451898"/>
+                </a:lnTo>
+                <a:lnTo>
+                  <a:pt x="0" y="4451898"/>
                 </a:lnTo>
                 <a:lnTo>
                   <a:pt x="0" y="0"/>
@@ -5510,10 +5746,11 @@
             </a:pathLst>
           </a:custGeom>
           <a:blipFill>
-            <a:blip r:embed="rId2">
+            <a:blip r:embed="rId3">
+              <a:alphaModFix amt="9999"/>
               <a:extLst>
                 <a:ext uri="{96DAC541-7B7A-43D3-8B79-37D633B846F1}">
-                  <asvg:svgBlip xmlns:asvg="http://schemas.microsoft.com/office/drawing/2016/SVG/main" r:embed="rId3"/>
+                  <asvg:svgBlip xmlns:asvg="http://schemas.microsoft.com/office/drawing/2016/SVG/main" r:embed="rId4"/>
                 </a:ext>
               </a:extLst>
             </a:blip>
@@ -5523,14 +5760,335 @@
           </a:blipFill>
         </p:spPr>
       </p:sp>
+      <p:sp>
+        <p:nvSpPr>
+          <p:cNvPr name="Freeform 6" id="6"/>
+          <p:cNvSpPr/>
+          <p:nvPr/>
+        </p:nvSpPr>
+        <p:spPr>
+          <a:xfrm flipH="false" flipV="false" rot="0">
+            <a:off x="14059664" y="8417842"/>
+            <a:ext cx="4757855" cy="3740863"/>
+          </a:xfrm>
+          <a:custGeom>
+            <a:avLst/>
+            <a:gdLst/>
+            <a:ahLst/>
+            <a:cxnLst/>
+            <a:rect r="r" b="b" t="t" l="l"/>
+            <a:pathLst>
+              <a:path h="3740863" w="4757855">
+                <a:moveTo>
+                  <a:pt x="0" y="0"/>
+                </a:moveTo>
+                <a:lnTo>
+                  <a:pt x="4757855" y="0"/>
+                </a:lnTo>
+                <a:lnTo>
+                  <a:pt x="4757855" y="3740864"/>
+                </a:lnTo>
+                <a:lnTo>
+                  <a:pt x="0" y="3740864"/>
+                </a:lnTo>
+                <a:lnTo>
+                  <a:pt x="0" y="0"/>
+                </a:lnTo>
+                <a:close/>
+              </a:path>
+            </a:pathLst>
+          </a:custGeom>
+          <a:blipFill>
+            <a:blip r:embed="rId5">
+              <a:alphaModFix amt="9999"/>
+              <a:extLst>
+                <a:ext uri="{96DAC541-7B7A-43D3-8B79-37D633B846F1}">
+                  <asvg:svgBlip xmlns:asvg="http://schemas.microsoft.com/office/drawing/2016/SVG/main" r:embed="rId6"/>
+                </a:ext>
+              </a:extLst>
+            </a:blip>
+            <a:stretch>
+              <a:fillRect l="0" t="0" r="0" b="0"/>
+            </a:stretch>
+          </a:blipFill>
+          <a:ln cap="sq">
+            <a:noFill/>
+            <a:prstDash val="solid"/>
+            <a:miter/>
+          </a:ln>
+        </p:spPr>
+      </p:sp>
+      <p:sp>
+        <p:nvSpPr>
+          <p:cNvPr name="Freeform 7" id="7"/>
+          <p:cNvSpPr/>
+          <p:nvPr/>
+        </p:nvSpPr>
+        <p:spPr>
+          <a:xfrm flipH="false" flipV="false" rot="4747568">
+            <a:off x="-3464778" y="4261352"/>
+            <a:ext cx="8646063" cy="4830988"/>
+          </a:xfrm>
+          <a:custGeom>
+            <a:avLst/>
+            <a:gdLst/>
+            <a:ahLst/>
+            <a:cxnLst/>
+            <a:rect r="r" b="b" t="t" l="l"/>
+            <a:pathLst>
+              <a:path h="4830988" w="8646063">
+                <a:moveTo>
+                  <a:pt x="0" y="0"/>
+                </a:moveTo>
+                <a:lnTo>
+                  <a:pt x="8646063" y="0"/>
+                </a:lnTo>
+                <a:lnTo>
+                  <a:pt x="8646063" y="4830987"/>
+                </a:lnTo>
+                <a:lnTo>
+                  <a:pt x="0" y="4830987"/>
+                </a:lnTo>
+                <a:lnTo>
+                  <a:pt x="0" y="0"/>
+                </a:lnTo>
+                <a:close/>
+              </a:path>
+            </a:pathLst>
+          </a:custGeom>
+          <a:blipFill>
+            <a:blip r:embed="rId7">
+              <a:alphaModFix amt="9999"/>
+              <a:extLst>
+                <a:ext uri="{96DAC541-7B7A-43D3-8B79-37D633B846F1}">
+                  <asvg:svgBlip xmlns:asvg="http://schemas.microsoft.com/office/drawing/2016/SVG/main" r:embed="rId8"/>
+                </a:ext>
+              </a:extLst>
+            </a:blip>
+            <a:stretch>
+              <a:fillRect l="0" t="0" r="0" b="0"/>
+            </a:stretch>
+          </a:blipFill>
+          <a:ln cap="sq">
+            <a:noFill/>
+            <a:prstDash val="solid"/>
+            <a:miter/>
+          </a:ln>
+        </p:spPr>
+      </p:sp>
+      <p:sp>
+        <p:nvSpPr>
+          <p:cNvPr name="Freeform 8" id="8"/>
+          <p:cNvSpPr/>
+          <p:nvPr/>
+        </p:nvSpPr>
+        <p:spPr>
+          <a:xfrm flipH="false" flipV="false" rot="-5282649">
+            <a:off x="13631657" y="6490303"/>
+            <a:ext cx="7558758" cy="2579426"/>
+          </a:xfrm>
+          <a:custGeom>
+            <a:avLst/>
+            <a:gdLst/>
+            <a:ahLst/>
+            <a:cxnLst/>
+            <a:rect r="r" b="b" t="t" l="l"/>
+            <a:pathLst>
+              <a:path h="2579426" w="7558758">
+                <a:moveTo>
+                  <a:pt x="0" y="0"/>
+                </a:moveTo>
+                <a:lnTo>
+                  <a:pt x="7558758" y="0"/>
+                </a:lnTo>
+                <a:lnTo>
+                  <a:pt x="7558758" y="2579426"/>
+                </a:lnTo>
+                <a:lnTo>
+                  <a:pt x="0" y="2579426"/>
+                </a:lnTo>
+                <a:lnTo>
+                  <a:pt x="0" y="0"/>
+                </a:lnTo>
+                <a:close/>
+              </a:path>
+            </a:pathLst>
+          </a:custGeom>
+          <a:blipFill>
+            <a:blip r:embed="rId9">
+              <a:alphaModFix amt="9999"/>
+              <a:extLst>
+                <a:ext uri="{96DAC541-7B7A-43D3-8B79-37D633B846F1}">
+                  <asvg:svgBlip xmlns:asvg="http://schemas.microsoft.com/office/drawing/2016/SVG/main" r:embed="rId10"/>
+                </a:ext>
+              </a:extLst>
+            </a:blip>
+            <a:stretch>
+              <a:fillRect l="0" t="0" r="0" b="0"/>
+            </a:stretch>
+          </a:blipFill>
+          <a:ln cap="sq">
+            <a:noFill/>
+            <a:prstDash val="solid"/>
+            <a:miter/>
+          </a:ln>
+        </p:spPr>
+      </p:sp>
+      <p:sp>
+        <p:nvSpPr>
+          <p:cNvPr name="Freeform 9" id="9"/>
+          <p:cNvSpPr/>
+          <p:nvPr/>
+        </p:nvSpPr>
+        <p:spPr>
+          <a:xfrm flipH="false" flipV="false" rot="0">
+            <a:off x="14832426" y="-642644"/>
+            <a:ext cx="5250734" cy="5653549"/>
+          </a:xfrm>
+          <a:custGeom>
+            <a:avLst/>
+            <a:gdLst/>
+            <a:ahLst/>
+            <a:cxnLst/>
+            <a:rect r="r" b="b" t="t" l="l"/>
+            <a:pathLst>
+              <a:path h="5653549" w="5250734">
+                <a:moveTo>
+                  <a:pt x="0" y="0"/>
+                </a:moveTo>
+                <a:lnTo>
+                  <a:pt x="5250734" y="0"/>
+                </a:lnTo>
+                <a:lnTo>
+                  <a:pt x="5250734" y="5653549"/>
+                </a:lnTo>
+                <a:lnTo>
+                  <a:pt x="0" y="5653549"/>
+                </a:lnTo>
+                <a:lnTo>
+                  <a:pt x="0" y="0"/>
+                </a:lnTo>
+                <a:close/>
+              </a:path>
+            </a:pathLst>
+          </a:custGeom>
+          <a:blipFill>
+            <a:blip r:embed="rId11">
+              <a:alphaModFix amt="9999"/>
+              <a:extLst>
+                <a:ext uri="{96DAC541-7B7A-43D3-8B79-37D633B846F1}">
+                  <asvg:svgBlip xmlns:asvg="http://schemas.microsoft.com/office/drawing/2016/SVG/main" r:embed="rId12"/>
+                </a:ext>
+              </a:extLst>
+            </a:blip>
+            <a:stretch>
+              <a:fillRect l="0" t="0" r="0" b="0"/>
+            </a:stretch>
+          </a:blipFill>
+          <a:ln cap="sq">
+            <a:noFill/>
+            <a:prstDash val="solid"/>
+            <a:miter/>
+          </a:ln>
+        </p:spPr>
+      </p:sp>
+      <p:sp>
+        <p:nvSpPr>
+          <p:cNvPr name="Freeform 10" id="10"/>
+          <p:cNvSpPr/>
+          <p:nvPr/>
+        </p:nvSpPr>
+        <p:spPr>
+          <a:xfrm flipH="false" flipV="false" rot="0">
+            <a:off x="0" y="-72925"/>
+            <a:ext cx="4577321" cy="10432849"/>
+          </a:xfrm>
+          <a:custGeom>
+            <a:avLst/>
+            <a:gdLst/>
+            <a:ahLst/>
+            <a:cxnLst/>
+            <a:rect r="r" b="b" t="t" l="l"/>
+            <a:pathLst>
+              <a:path h="10432849" w="4577321">
+                <a:moveTo>
+                  <a:pt x="0" y="0"/>
+                </a:moveTo>
+                <a:lnTo>
+                  <a:pt x="4577321" y="0"/>
+                </a:lnTo>
+                <a:lnTo>
+                  <a:pt x="4577321" y="10432850"/>
+                </a:lnTo>
+                <a:lnTo>
+                  <a:pt x="0" y="10432850"/>
+                </a:lnTo>
+                <a:lnTo>
+                  <a:pt x="0" y="0"/>
+                </a:lnTo>
+                <a:close/>
+              </a:path>
+            </a:pathLst>
+          </a:custGeom>
+          <a:blipFill>
+            <a:blip r:embed="rId13"/>
+            <a:stretch>
+              <a:fillRect l="0" t="0" r="-127924" b="0"/>
+            </a:stretch>
+          </a:blipFill>
+        </p:spPr>
+      </p:sp>
+      <p:sp>
+        <p:nvSpPr>
+          <p:cNvPr name="Freeform 11" id="11"/>
+          <p:cNvSpPr/>
+          <p:nvPr/>
+        </p:nvSpPr>
+        <p:spPr>
+          <a:xfrm flipH="false" flipV="false" rot="0">
+            <a:off x="13698174" y="-72925"/>
+            <a:ext cx="4589826" cy="10432849"/>
+          </a:xfrm>
+          <a:custGeom>
+            <a:avLst/>
+            <a:gdLst/>
+            <a:ahLst/>
+            <a:cxnLst/>
+            <a:rect r="r" b="b" t="t" l="l"/>
+            <a:pathLst>
+              <a:path h="10432849" w="4589826">
+                <a:moveTo>
+                  <a:pt x="0" y="0"/>
+                </a:moveTo>
+                <a:lnTo>
+                  <a:pt x="4589826" y="0"/>
+                </a:lnTo>
+                <a:lnTo>
+                  <a:pt x="4589826" y="10432850"/>
+                </a:lnTo>
+                <a:lnTo>
+                  <a:pt x="0" y="10432850"/>
+                </a:lnTo>
+                <a:lnTo>
+                  <a:pt x="0" y="0"/>
+                </a:lnTo>
+                <a:close/>
+              </a:path>
+            </a:pathLst>
+          </a:custGeom>
+          <a:blipFill>
+            <a:blip r:embed="rId13"/>
+            <a:stretch>
+              <a:fillRect l="-127303" t="0" r="0" b="0"/>
+            </a:stretch>
+          </a:blipFill>
+        </p:spPr>
+      </p:sp>
     </p:spTree>
   </p:cSld>
   <p:clrMapOvr>
     <a:masterClrMapping/>
   </p:clrMapOvr>
-  <p:transition spd="fast">
-    <p:push dir="l"/>
-  </p:transition>
 </p:sld>
 </file>
 
@@ -5559,8 +6117,8 @@
         </p:nvSpPr>
         <p:spPr>
           <a:xfrm flipH="false" flipV="false" rot="0">
-            <a:off x="430942" y="0"/>
-            <a:ext cx="17426116" cy="10057013"/>
+            <a:off x="215471" y="0"/>
+            <a:ext cx="17857058" cy="10312679"/>
           </a:xfrm>
           <a:custGeom>
             <a:avLst/>
@@ -5569,18 +6127,18 @@
             <a:cxnLst/>
             <a:rect r="r" b="b" t="t" l="l"/>
             <a:pathLst>
-              <a:path h="10057013" w="17426116">
+              <a:path h="10312679" w="17857058">
                 <a:moveTo>
                   <a:pt x="0" y="0"/>
                 </a:moveTo>
                 <a:lnTo>
-                  <a:pt x="17426116" y="0"/>
-                </a:lnTo>
-                <a:lnTo>
-                  <a:pt x="17426116" y="10057013"/>
-                </a:lnTo>
-                <a:lnTo>
-                  <a:pt x="0" y="10057013"/>
+                  <a:pt x="17857058" y="0"/>
+                </a:lnTo>
+                <a:lnTo>
+                  <a:pt x="17857058" y="10312679"/>
+                </a:lnTo>
+                <a:lnTo>
+                  <a:pt x="0" y="10312679"/>
                 </a:lnTo>
                 <a:lnTo>
                   <a:pt x="0" y="0"/>
@@ -5603,30 +6161,140 @@
           </a:blipFill>
         </p:spPr>
       </p:sp>
+    </p:spTree>
+  </p:cSld>
+  <p:clrMapOvr>
+    <a:masterClrMapping/>
+  </p:clrMapOvr>
+</p:sld>
+</file>
+
+<file path=ppt/slides/slide4.xml><?xml version="1.0" encoding="utf-8"?>
+<p:sld xmlns:p="http://schemas.openxmlformats.org/presentationml/2006/main" xmlns:a="http://schemas.openxmlformats.org/drawingml/2006/main" xmlns:r="http://schemas.openxmlformats.org/officeDocument/2006/relationships">
+  <p:cSld>
+    <p:spTree>
+      <p:nvGrpSpPr>
+        <p:cNvPr id="1" name=""/>
+        <p:cNvGrpSpPr/>
+        <p:nvPr/>
+      </p:nvGrpSpPr>
+      <p:grpSpPr>
+        <a:xfrm>
+          <a:off x="0" y="0"/>
+          <a:ext cx="0" cy="0"/>
+          <a:chOff x="0" y="0"/>
+          <a:chExt cx="0" cy="0"/>
+        </a:xfrm>
+      </p:grpSpPr>
       <p:grpSp>
         <p:nvGrpSpPr>
-          <p:cNvPr name="Group 3" id="3"/>
+          <p:cNvPr name="Group 2" id="2"/>
           <p:cNvGrpSpPr/>
           <p:nvPr/>
         </p:nvGrpSpPr>
         <p:grpSpPr>
           <a:xfrm rot="0">
-            <a:off x="3117138" y="8240991"/>
-            <a:ext cx="10256108" cy="3086100"/>
+            <a:off x="295895" y="-140472"/>
+            <a:ext cx="17696211" cy="11467563"/>
             <a:chOff x="0" y="0"/>
-            <a:chExt cx="2701197" cy="812800"/>
+            <a:chExt cx="23594948" cy="15290084"/>
           </a:xfrm>
         </p:grpSpPr>
+        <p:grpSp>
+          <p:nvGrpSpPr>
+            <p:cNvPr name="Group 3" id="3"/>
+            <p:cNvGrpSpPr/>
+            <p:nvPr/>
+          </p:nvGrpSpPr>
+          <p:grpSpPr>
+            <a:xfrm rot="0">
+              <a:off x="3761658" y="11290898"/>
+              <a:ext cx="13674811" cy="3999186"/>
+              <a:chOff x="0" y="0"/>
+              <a:chExt cx="2701197" cy="789963"/>
+            </a:xfrm>
+          </p:grpSpPr>
+          <p:sp>
+            <p:nvSpPr>
+              <p:cNvPr name="Freeform 4" id="4"/>
+              <p:cNvSpPr/>
+              <p:nvPr/>
+            </p:nvSpPr>
+            <p:spPr>
+              <a:xfrm flipH="false" flipV="false" rot="0">
+                <a:off x="0" y="0"/>
+                <a:ext cx="2701197" cy="789963"/>
+              </a:xfrm>
+              <a:custGeom>
+                <a:avLst/>
+                <a:gdLst/>
+                <a:ahLst/>
+                <a:cxnLst/>
+                <a:rect r="r" b="b" t="t" l="l"/>
+                <a:pathLst>
+                  <a:path h="789963" w="2701197">
+                    <a:moveTo>
+                      <a:pt x="0" y="0"/>
+                    </a:moveTo>
+                    <a:lnTo>
+                      <a:pt x="2701197" y="0"/>
+                    </a:lnTo>
+                    <a:lnTo>
+                      <a:pt x="2701197" y="789963"/>
+                    </a:lnTo>
+                    <a:lnTo>
+                      <a:pt x="0" y="789963"/>
+                    </a:lnTo>
+                    <a:close/>
+                  </a:path>
+                </a:pathLst>
+              </a:custGeom>
+              <a:solidFill>
+                <a:srgbClr val="FFFFFF"/>
+              </a:solidFill>
+            </p:spPr>
+          </p:sp>
+          <p:sp>
+            <p:nvSpPr>
+              <p:cNvPr name="TextBox 5" id="5"/>
+              <p:cNvSpPr txBox="true"/>
+              <p:nvPr/>
+            </p:nvSpPr>
+            <p:spPr>
+              <a:xfrm>
+                <a:off x="0" y="-38100"/>
+                <a:ext cx="2701197" cy="828063"/>
+              </a:xfrm>
+              <a:prstGeom prst="rect">
+                <a:avLst/>
+              </a:prstGeom>
+            </p:spPr>
+            <p:txBody>
+              <a:bodyPr anchor="ctr" rtlCol="false" tIns="50800" lIns="50800" bIns="50800" rIns="50800"/>
+              <a:lstStyle/>
+              <a:p>
+                <a:pPr algn="ctr">
+                  <a:lnSpc>
+                    <a:spcPts val="2659"/>
+                  </a:lnSpc>
+                  <a:spcBef>
+                    <a:spcPct val="0"/>
+                  </a:spcBef>
+                </a:pPr>
+              </a:p>
+            </p:txBody>
+          </p:sp>
+        </p:grpSp>
         <p:sp>
           <p:nvSpPr>
-            <p:cNvPr name="Freeform 4" id="4"/>
+            <p:cNvPr name="Freeform 6" id="6"/>
             <p:cNvSpPr/>
             <p:nvPr/>
           </p:nvSpPr>
           <p:spPr>
             <a:xfrm flipH="false" flipV="false" rot="0">
               <a:off x="0" y="0"/>
-              <a:ext cx="2701197" cy="812800"/>
+              <a:ext cx="23594948" cy="13626384"/>
             </a:xfrm>
             <a:custGeom>
               <a:avLst/>
@@ -5635,83 +6303,142 @@
               <a:cxnLst/>
               <a:rect r="r" b="b" t="t" l="l"/>
               <a:pathLst>
-                <a:path h="812800" w="2701197">
+                <a:path h="13626384" w="23594948">
                   <a:moveTo>
                     <a:pt x="0" y="0"/>
                   </a:moveTo>
                   <a:lnTo>
-                    <a:pt x="2701197" y="0"/>
+                    <a:pt x="23594948" y="0"/>
                   </a:lnTo>
                   <a:lnTo>
-                    <a:pt x="2701197" y="812800"/>
+                    <a:pt x="23594948" y="13626384"/>
                   </a:lnTo>
                   <a:lnTo>
-                    <a:pt x="0" y="812800"/>
+                    <a:pt x="0" y="13626384"/>
+                  </a:lnTo>
+                  <a:lnTo>
+                    <a:pt x="0" y="0"/>
                   </a:lnTo>
                   <a:close/>
                 </a:path>
               </a:pathLst>
             </a:custGeom>
-            <a:solidFill>
-              <a:srgbClr val="FFFFFF"/>
-            </a:solidFill>
+            <a:blipFill>
+              <a:blip r:embed="rId2">
+                <a:extLst>
+                  <a:ext uri="{96DAC541-7B7A-43D3-8B79-37D633B846F1}">
+                    <asvg:svgBlip xmlns:asvg="http://schemas.microsoft.com/office/drawing/2016/SVG/main" r:embed="rId3"/>
+                  </a:ext>
+                </a:extLst>
+              </a:blip>
+              <a:stretch>
+                <a:fillRect l="0" t="0" r="0" b="0"/>
+              </a:stretch>
+            </a:blipFill>
           </p:spPr>
         </p:sp>
+        <p:grpSp>
+          <p:nvGrpSpPr>
+            <p:cNvPr name="Group 7" id="7"/>
+            <p:cNvGrpSpPr/>
+            <p:nvPr/>
+          </p:nvGrpSpPr>
+          <p:grpSpPr>
+            <a:xfrm rot="0">
+              <a:off x="573175" y="11290898"/>
+              <a:ext cx="22448598" cy="2481596"/>
+              <a:chOff x="0" y="0"/>
+              <a:chExt cx="4434291" cy="490192"/>
+            </a:xfrm>
+          </p:grpSpPr>
+          <p:sp>
+            <p:nvSpPr>
+              <p:cNvPr name="Freeform 8" id="8"/>
+              <p:cNvSpPr/>
+              <p:nvPr/>
+            </p:nvSpPr>
+            <p:spPr>
+              <a:xfrm flipH="false" flipV="false" rot="0">
+                <a:off x="0" y="0"/>
+                <a:ext cx="4434291" cy="490192"/>
+              </a:xfrm>
+              <a:custGeom>
+                <a:avLst/>
+                <a:gdLst/>
+                <a:ahLst/>
+                <a:cxnLst/>
+                <a:rect r="r" b="b" t="t" l="l"/>
+                <a:pathLst>
+                  <a:path h="490192" w="4434291">
+                    <a:moveTo>
+                      <a:pt x="0" y="0"/>
+                    </a:moveTo>
+                    <a:lnTo>
+                      <a:pt x="4434291" y="0"/>
+                    </a:lnTo>
+                    <a:lnTo>
+                      <a:pt x="4434291" y="490192"/>
+                    </a:lnTo>
+                    <a:lnTo>
+                      <a:pt x="0" y="490192"/>
+                    </a:lnTo>
+                    <a:close/>
+                  </a:path>
+                </a:pathLst>
+              </a:custGeom>
+              <a:solidFill>
+                <a:srgbClr val="FFFFFF"/>
+              </a:solidFill>
+              <a:ln w="38100" cap="sq">
+                <a:solidFill>
+                  <a:srgbClr val="4E5586"/>
+                </a:solidFill>
+                <a:prstDash val="solid"/>
+                <a:miter/>
+              </a:ln>
+            </p:spPr>
+          </p:sp>
+          <p:sp>
+            <p:nvSpPr>
+              <p:cNvPr name="TextBox 9" id="9"/>
+              <p:cNvSpPr txBox="true"/>
+              <p:nvPr/>
+            </p:nvSpPr>
+            <p:spPr>
+              <a:xfrm>
+                <a:off x="0" y="-38100"/>
+                <a:ext cx="4434291" cy="528292"/>
+              </a:xfrm>
+              <a:prstGeom prst="rect">
+                <a:avLst/>
+              </a:prstGeom>
+            </p:spPr>
+            <p:txBody>
+              <a:bodyPr anchor="ctr" rtlCol="false" tIns="50800" lIns="50800" bIns="50800" rIns="50800"/>
+              <a:lstStyle/>
+              <a:p>
+                <a:pPr algn="ctr">
+                  <a:lnSpc>
+                    <a:spcPts val="2659"/>
+                  </a:lnSpc>
+                  <a:spcBef>
+                    <a:spcPct val="0"/>
+                  </a:spcBef>
+                </a:pPr>
+              </a:p>
+            </p:txBody>
+          </p:sp>
+        </p:grpSp>
         <p:sp>
           <p:nvSpPr>
-            <p:cNvPr name="TextBox 5" id="5"/>
-            <p:cNvSpPr txBox="true"/>
-            <p:nvPr/>
-          </p:nvSpPr>
-          <p:spPr>
-            <a:xfrm>
-              <a:off x="0" y="-38100"/>
-              <a:ext cx="2701197" cy="850900"/>
-            </a:xfrm>
-            <a:prstGeom prst="rect">
-              <a:avLst/>
-            </a:prstGeom>
-          </p:spPr>
-          <p:txBody>
-            <a:bodyPr anchor="ctr" rtlCol="false" tIns="50800" lIns="50800" bIns="50800" rIns="50800"/>
-            <a:lstStyle/>
-            <a:p>
-              <a:pPr algn="ctr">
-                <a:lnSpc>
-                  <a:spcPts val="2659"/>
-                </a:lnSpc>
-                <a:spcBef>
-                  <a:spcPct val="0"/>
-                </a:spcBef>
-              </a:pPr>
-            </a:p>
-          </p:txBody>
-        </p:sp>
-      </p:grpSp>
-      <p:grpSp>
-        <p:nvGrpSpPr>
-          <p:cNvPr name="Group 6" id="6"/>
-          <p:cNvGrpSpPr/>
-          <p:nvPr/>
-        </p:nvGrpSpPr>
-        <p:grpSpPr>
-          <a:xfrm rot="0">
-            <a:off x="725776" y="8327702"/>
-            <a:ext cx="16836449" cy="1861197"/>
-            <a:chOff x="0" y="0"/>
-            <a:chExt cx="4434291" cy="490192"/>
-          </a:xfrm>
-        </p:grpSpPr>
-        <p:sp>
-          <p:nvSpPr>
-            <p:cNvPr name="Freeform 7" id="7"/>
+            <p:cNvPr name="Freeform 10" id="10"/>
             <p:cNvSpPr/>
             <p:nvPr/>
           </p:nvSpPr>
           <p:spPr>
             <a:xfrm flipH="false" flipV="false" rot="0">
-              <a:off x="0" y="0"/>
-              <a:ext cx="4434291" cy="490192"/>
+              <a:off x="20654431" y="11367203"/>
+              <a:ext cx="1943396" cy="2328987"/>
             </a:xfrm>
             <a:custGeom>
               <a:avLst/>
@@ -5720,286 +6447,206 @@
               <a:cxnLst/>
               <a:rect r="r" b="b" t="t" l="l"/>
               <a:pathLst>
-                <a:path h="490192" w="4434291">
+                <a:path h="2328987" w="1943396">
                   <a:moveTo>
                     <a:pt x="0" y="0"/>
                   </a:moveTo>
                   <a:lnTo>
-                    <a:pt x="4434291" y="0"/>
+                    <a:pt x="1943395" y="0"/>
                   </a:lnTo>
                   <a:lnTo>
-                    <a:pt x="4434291" y="490192"/>
+                    <a:pt x="1943395" y="2328986"/>
                   </a:lnTo>
                   <a:lnTo>
-                    <a:pt x="0" y="490192"/>
+                    <a:pt x="0" y="2328986"/>
+                  </a:lnTo>
+                  <a:lnTo>
+                    <a:pt x="0" y="0"/>
                   </a:lnTo>
                   <a:close/>
                 </a:path>
               </a:pathLst>
             </a:custGeom>
-            <a:solidFill>
-              <a:srgbClr val="FFFFFF"/>
-            </a:solidFill>
-            <a:ln w="38100" cap="sq">
-              <a:solidFill>
-                <a:srgbClr val="4E5586"/>
-              </a:solidFill>
-              <a:prstDash val="solid"/>
-              <a:miter/>
-            </a:ln>
+            <a:blipFill>
+              <a:blip r:embed="rId4">
+                <a:extLst>
+                  <a:ext uri="{96DAC541-7B7A-43D3-8B79-37D633B846F1}">
+                    <asvg:svgBlip xmlns:asvg="http://schemas.microsoft.com/office/drawing/2016/SVG/main" r:embed="rId5"/>
+                  </a:ext>
+                </a:extLst>
+              </a:blip>
+              <a:stretch>
+                <a:fillRect l="0" t="0" r="0" b="-67496"/>
+              </a:stretch>
+            </a:blipFill>
           </p:spPr>
         </p:sp>
         <p:sp>
           <p:nvSpPr>
-            <p:cNvPr name="TextBox 8" id="8"/>
-            <p:cNvSpPr txBox="true"/>
+            <p:cNvPr name="Freeform 11" id="11"/>
+            <p:cNvSpPr/>
             <p:nvPr/>
           </p:nvSpPr>
           <p:spPr>
-            <a:xfrm>
-              <a:off x="0" y="-38100"/>
-              <a:ext cx="4434291" cy="528292"/>
+            <a:xfrm flipH="false" flipV="false" rot="0">
+              <a:off x="12457995" y="11378821"/>
+              <a:ext cx="1299785" cy="2305749"/>
             </a:xfrm>
-            <a:prstGeom prst="rect">
+            <a:custGeom>
               <a:avLst/>
-            </a:prstGeom>
+              <a:gdLst/>
+              <a:ahLst/>
+              <a:cxnLst/>
+              <a:rect r="r" b="b" t="t" l="l"/>
+              <a:pathLst>
+                <a:path h="2305749" w="1299785">
+                  <a:moveTo>
+                    <a:pt x="0" y="0"/>
+                  </a:moveTo>
+                  <a:lnTo>
+                    <a:pt x="1299785" y="0"/>
+                  </a:lnTo>
+                  <a:lnTo>
+                    <a:pt x="1299785" y="2305750"/>
+                  </a:lnTo>
+                  <a:lnTo>
+                    <a:pt x="0" y="2305750"/>
+                  </a:lnTo>
+                  <a:lnTo>
+                    <a:pt x="0" y="0"/>
+                  </a:lnTo>
+                  <a:close/>
+                </a:path>
+              </a:pathLst>
+            </a:custGeom>
+            <a:blipFill>
+              <a:blip r:embed="rId6">
+                <a:extLst>
+                  <a:ext uri="{96DAC541-7B7A-43D3-8B79-37D633B846F1}">
+                    <asvg:svgBlip xmlns:asvg="http://schemas.microsoft.com/office/drawing/2016/SVG/main" r:embed="rId7"/>
+                  </a:ext>
+                </a:extLst>
+              </a:blip>
+              <a:stretch>
+                <a:fillRect l="-254389" t="-91033" r="-242888" b="-3025"/>
+              </a:stretch>
+            </a:blipFill>
           </p:spPr>
-          <p:txBody>
-            <a:bodyPr anchor="ctr" rtlCol="false" tIns="50800" lIns="50800" bIns="50800" rIns="50800"/>
-            <a:lstStyle/>
-            <a:p>
-              <a:pPr algn="ctr">
-                <a:lnSpc>
-                  <a:spcPts val="2659"/>
-                </a:lnSpc>
-                <a:spcBef>
-                  <a:spcPct val="0"/>
-                </a:spcBef>
-              </a:pPr>
-            </a:p>
-          </p:txBody>
+        </p:sp>
+        <p:sp>
+          <p:nvSpPr>
+            <p:cNvPr name="Freeform 12" id="12"/>
+            <p:cNvSpPr/>
+            <p:nvPr/>
+          </p:nvSpPr>
+          <p:spPr>
+            <a:xfrm flipH="false" flipV="false" rot="0">
+              <a:off x="6019016" y="11378821"/>
+              <a:ext cx="1796419" cy="2305749"/>
+            </a:xfrm>
+            <a:custGeom>
+              <a:avLst/>
+              <a:gdLst/>
+              <a:ahLst/>
+              <a:cxnLst/>
+              <a:rect r="r" b="b" t="t" l="l"/>
+              <a:pathLst>
+                <a:path h="2305749" w="1796419">
+                  <a:moveTo>
+                    <a:pt x="0" y="0"/>
+                  </a:moveTo>
+                  <a:lnTo>
+                    <a:pt x="1796419" y="0"/>
+                  </a:lnTo>
+                  <a:lnTo>
+                    <a:pt x="1796419" y="2305750"/>
+                  </a:lnTo>
+                  <a:lnTo>
+                    <a:pt x="0" y="2305750"/>
+                  </a:lnTo>
+                  <a:lnTo>
+                    <a:pt x="0" y="0"/>
+                  </a:lnTo>
+                  <a:close/>
+                </a:path>
+              </a:pathLst>
+            </a:custGeom>
+            <a:blipFill>
+              <a:blip r:embed="rId6">
+                <a:extLst>
+                  <a:ext uri="{96DAC541-7B7A-43D3-8B79-37D633B846F1}">
+                    <asvg:svgBlip xmlns:asvg="http://schemas.microsoft.com/office/drawing/2016/SVG/main" r:embed="rId7"/>
+                  </a:ext>
+                </a:extLst>
+              </a:blip>
+              <a:stretch>
+                <a:fillRect l="0" t="-93137" r="-336606" b="-2920"/>
+              </a:stretch>
+            </a:blipFill>
+          </p:spPr>
+        </p:sp>
+        <p:sp>
+          <p:nvSpPr>
+            <p:cNvPr name="Freeform 13" id="13"/>
+            <p:cNvSpPr/>
+            <p:nvPr/>
+          </p:nvSpPr>
+          <p:spPr>
+            <a:xfrm flipH="false" flipV="false" rot="0">
+              <a:off x="1065974" y="11353317"/>
+              <a:ext cx="1351882" cy="2342873"/>
+            </a:xfrm>
+            <a:custGeom>
+              <a:avLst/>
+              <a:gdLst/>
+              <a:ahLst/>
+              <a:cxnLst/>
+              <a:rect r="r" b="b" t="t" l="l"/>
+              <a:pathLst>
+                <a:path h="2342873" w="1351882">
+                  <a:moveTo>
+                    <a:pt x="0" y="0"/>
+                  </a:moveTo>
+                  <a:lnTo>
+                    <a:pt x="1351882" y="0"/>
+                  </a:lnTo>
+                  <a:lnTo>
+                    <a:pt x="1351882" y="2342872"/>
+                  </a:lnTo>
+                  <a:lnTo>
+                    <a:pt x="0" y="2342872"/>
+                  </a:lnTo>
+                  <a:lnTo>
+                    <a:pt x="0" y="0"/>
+                  </a:lnTo>
+                  <a:close/>
+                </a:path>
+              </a:pathLst>
+            </a:custGeom>
+            <a:blipFill>
+              <a:blip r:embed="rId6">
+                <a:extLst>
+                  <a:ext uri="{96DAC541-7B7A-43D3-8B79-37D633B846F1}">
+                    <asvg:svgBlip xmlns:asvg="http://schemas.microsoft.com/office/drawing/2016/SVG/main" r:embed="rId7"/>
+                  </a:ext>
+                </a:extLst>
+              </a:blip>
+              <a:stretch>
+                <a:fillRect l="-139956" t="0" r="-382962" b="-107165"/>
+              </a:stretch>
+            </a:blipFill>
+          </p:spPr>
         </p:sp>
       </p:grpSp>
-      <p:sp>
-        <p:nvSpPr>
-          <p:cNvPr name="Freeform 9" id="9"/>
-          <p:cNvSpPr/>
-          <p:nvPr/>
-        </p:nvSpPr>
-        <p:spPr>
-          <a:xfrm flipH="false" flipV="false" rot="0">
-            <a:off x="15786718" y="8384930"/>
-            <a:ext cx="1457547" cy="1746740"/>
-          </a:xfrm>
-          <a:custGeom>
-            <a:avLst/>
-            <a:gdLst/>
-            <a:ahLst/>
-            <a:cxnLst/>
-            <a:rect r="r" b="b" t="t" l="l"/>
-            <a:pathLst>
-              <a:path h="1746740" w="1457547">
-                <a:moveTo>
-                  <a:pt x="0" y="0"/>
-                </a:moveTo>
-                <a:lnTo>
-                  <a:pt x="1457546" y="0"/>
-                </a:lnTo>
-                <a:lnTo>
-                  <a:pt x="1457546" y="1746740"/>
-                </a:lnTo>
-                <a:lnTo>
-                  <a:pt x="0" y="1746740"/>
-                </a:lnTo>
-                <a:lnTo>
-                  <a:pt x="0" y="0"/>
-                </a:lnTo>
-                <a:close/>
-              </a:path>
-            </a:pathLst>
-          </a:custGeom>
-          <a:blipFill>
-            <a:blip r:embed="rId4">
-              <a:extLst>
-                <a:ext uri="{96DAC541-7B7A-43D3-8B79-37D633B846F1}">
-                  <asvg:svgBlip xmlns:asvg="http://schemas.microsoft.com/office/drawing/2016/SVG/main" r:embed="rId5"/>
-                </a:ext>
-              </a:extLst>
-            </a:blip>
-            <a:stretch>
-              <a:fillRect l="0" t="0" r="0" b="-67496"/>
-            </a:stretch>
-          </a:blipFill>
-        </p:spPr>
-      </p:sp>
-      <p:sp>
-        <p:nvSpPr>
-          <p:cNvPr name="Freeform 10" id="10"/>
-          <p:cNvSpPr/>
-          <p:nvPr/>
-        </p:nvSpPr>
-        <p:spPr>
-          <a:xfrm flipH="false" flipV="false" rot="0">
-            <a:off x="9639391" y="8393644"/>
-            <a:ext cx="974839" cy="1729312"/>
-          </a:xfrm>
-          <a:custGeom>
-            <a:avLst/>
-            <a:gdLst/>
-            <a:ahLst/>
-            <a:cxnLst/>
-            <a:rect r="r" b="b" t="t" l="l"/>
-            <a:pathLst>
-              <a:path h="1729312" w="974839">
-                <a:moveTo>
-                  <a:pt x="0" y="0"/>
-                </a:moveTo>
-                <a:lnTo>
-                  <a:pt x="974838" y="0"/>
-                </a:lnTo>
-                <a:lnTo>
-                  <a:pt x="974838" y="1729312"/>
-                </a:lnTo>
-                <a:lnTo>
-                  <a:pt x="0" y="1729312"/>
-                </a:lnTo>
-                <a:lnTo>
-                  <a:pt x="0" y="0"/>
-                </a:lnTo>
-                <a:close/>
-              </a:path>
-            </a:pathLst>
-          </a:custGeom>
-          <a:blipFill>
-            <a:blip r:embed="rId6">
-              <a:extLst>
-                <a:ext uri="{96DAC541-7B7A-43D3-8B79-37D633B846F1}">
-                  <asvg:svgBlip xmlns:asvg="http://schemas.microsoft.com/office/drawing/2016/SVG/main" r:embed="rId7"/>
-                </a:ext>
-              </a:extLst>
-            </a:blip>
-            <a:stretch>
-              <a:fillRect l="-254389" t="-91033" r="-242888" b="-3025"/>
-            </a:stretch>
-          </a:blipFill>
-        </p:spPr>
-      </p:sp>
-      <p:sp>
-        <p:nvSpPr>
-          <p:cNvPr name="Freeform 11" id="11"/>
-          <p:cNvSpPr/>
-          <p:nvPr/>
-        </p:nvSpPr>
-        <p:spPr>
-          <a:xfrm flipH="false" flipV="false" rot="0">
-            <a:off x="4810156" y="8393644"/>
-            <a:ext cx="1347314" cy="1729312"/>
-          </a:xfrm>
-          <a:custGeom>
-            <a:avLst/>
-            <a:gdLst/>
-            <a:ahLst/>
-            <a:cxnLst/>
-            <a:rect r="r" b="b" t="t" l="l"/>
-            <a:pathLst>
-              <a:path h="1729312" w="1347314">
-                <a:moveTo>
-                  <a:pt x="0" y="0"/>
-                </a:moveTo>
-                <a:lnTo>
-                  <a:pt x="1347315" y="0"/>
-                </a:lnTo>
-                <a:lnTo>
-                  <a:pt x="1347315" y="1729312"/>
-                </a:lnTo>
-                <a:lnTo>
-                  <a:pt x="0" y="1729312"/>
-                </a:lnTo>
-                <a:lnTo>
-                  <a:pt x="0" y="0"/>
-                </a:lnTo>
-                <a:close/>
-              </a:path>
-            </a:pathLst>
-          </a:custGeom>
-          <a:blipFill>
-            <a:blip r:embed="rId6">
-              <a:extLst>
-                <a:ext uri="{96DAC541-7B7A-43D3-8B79-37D633B846F1}">
-                  <asvg:svgBlip xmlns:asvg="http://schemas.microsoft.com/office/drawing/2016/SVG/main" r:embed="rId7"/>
-                </a:ext>
-              </a:extLst>
-            </a:blip>
-            <a:stretch>
-              <a:fillRect l="0" t="-93137" r="-336606" b="-2920"/>
-            </a:stretch>
-          </a:blipFill>
-        </p:spPr>
-      </p:sp>
-      <p:sp>
-        <p:nvSpPr>
-          <p:cNvPr name="Freeform 12" id="12"/>
-          <p:cNvSpPr/>
-          <p:nvPr/>
-        </p:nvSpPr>
-        <p:spPr>
-          <a:xfrm flipH="false" flipV="false" rot="0">
-            <a:off x="1095375" y="8374516"/>
-            <a:ext cx="1013911" cy="1757154"/>
-          </a:xfrm>
-          <a:custGeom>
-            <a:avLst/>
-            <a:gdLst/>
-            <a:ahLst/>
-            <a:cxnLst/>
-            <a:rect r="r" b="b" t="t" l="l"/>
-            <a:pathLst>
-              <a:path h="1757154" w="1013911">
-                <a:moveTo>
-                  <a:pt x="0" y="0"/>
-                </a:moveTo>
-                <a:lnTo>
-                  <a:pt x="1013911" y="0"/>
-                </a:lnTo>
-                <a:lnTo>
-                  <a:pt x="1013911" y="1757154"/>
-                </a:lnTo>
-                <a:lnTo>
-                  <a:pt x="0" y="1757154"/>
-                </a:lnTo>
-                <a:lnTo>
-                  <a:pt x="0" y="0"/>
-                </a:lnTo>
-                <a:close/>
-              </a:path>
-            </a:pathLst>
-          </a:custGeom>
-          <a:blipFill>
-            <a:blip r:embed="rId6">
-              <a:extLst>
-                <a:ext uri="{96DAC541-7B7A-43D3-8B79-37D633B846F1}">
-                  <asvg:svgBlip xmlns:asvg="http://schemas.microsoft.com/office/drawing/2016/SVG/main" r:embed="rId7"/>
-                </a:ext>
-              </a:extLst>
-            </a:blip>
-            <a:stretch>
-              <a:fillRect l="-139956" t="0" r="-382962" b="-107165"/>
-            </a:stretch>
-          </a:blipFill>
-        </p:spPr>
-      </p:sp>
     </p:spTree>
   </p:cSld>
   <p:clrMapOvr>
     <a:masterClrMapping/>
   </p:clrMapOvr>
-  <p:transition spd="fast">
-    <p:push dir="l"/>
-  </p:transition>
 </p:sld>
 </file>
 
-<file path=ppt/slides/slide4.xml><?xml version="1.0" encoding="utf-8"?>
+<file path=ppt/slides/slide5.xml><?xml version="1.0" encoding="utf-8"?>
 <p:sld xmlns:p="http://schemas.openxmlformats.org/presentationml/2006/main" xmlns:a="http://schemas.openxmlformats.org/drawingml/2006/main" xmlns:r="http://schemas.openxmlformats.org/officeDocument/2006/relationships">
   <p:cSld>
     <p:spTree>
@@ -6112,101 +6759,101 @@
             <a:off x="611476" y="400118"/>
             <a:ext cx="16836449" cy="9486764"/>
             <a:chOff x="0" y="0"/>
-            <a:chExt cx="4434291" cy="2498572"/>
+            <a:chExt cx="22448598" cy="12649019"/>
           </a:xfrm>
         </p:grpSpPr>
-        <p:sp>
-          <p:nvSpPr>
-            <p:cNvPr name="Freeform 6" id="6"/>
-            <p:cNvSpPr/>
+        <p:grpSp>
+          <p:nvGrpSpPr>
+            <p:cNvPr name="Group 6" id="6"/>
+            <p:cNvGrpSpPr/>
             <p:nvPr/>
-          </p:nvSpPr>
-          <p:spPr>
-            <a:xfrm flipH="false" flipV="false" rot="0">
+          </p:nvGrpSpPr>
+          <p:grpSpPr>
+            <a:xfrm rot="0">
               <a:off x="0" y="0"/>
-              <a:ext cx="4434291" cy="2498572"/>
+              <a:ext cx="22448598" cy="12649019"/>
+              <a:chOff x="0" y="0"/>
+              <a:chExt cx="4434291" cy="2498572"/>
             </a:xfrm>
-            <a:custGeom>
-              <a:avLst/>
-              <a:gdLst/>
-              <a:ahLst/>
-              <a:cxnLst/>
-              <a:rect r="r" b="b" t="t" l="l"/>
-              <a:pathLst>
-                <a:path h="2498572" w="4434291">
-                  <a:moveTo>
-                    <a:pt x="0" y="0"/>
-                  </a:moveTo>
-                  <a:lnTo>
-                    <a:pt x="4434291" y="0"/>
-                  </a:lnTo>
-                  <a:lnTo>
-                    <a:pt x="4434291" y="2498572"/>
-                  </a:lnTo>
-                  <a:lnTo>
-                    <a:pt x="0" y="2498572"/>
-                  </a:lnTo>
-                  <a:close/>
-                </a:path>
-              </a:pathLst>
-            </a:custGeom>
-            <a:solidFill>
-              <a:srgbClr val="FFFFFF"/>
-            </a:solidFill>
-            <a:ln w="238125" cap="sq">
+          </p:grpSpPr>
+          <p:sp>
+            <p:nvSpPr>
+              <p:cNvPr name="Freeform 7" id="7"/>
+              <p:cNvSpPr/>
+              <p:nvPr/>
+            </p:nvSpPr>
+            <p:spPr>
+              <a:xfrm flipH="false" flipV="false" rot="0">
+                <a:off x="0" y="0"/>
+                <a:ext cx="4434291" cy="2498572"/>
+              </a:xfrm>
+              <a:custGeom>
+                <a:avLst/>
+                <a:gdLst/>
+                <a:ahLst/>
+                <a:cxnLst/>
+                <a:rect r="r" b="b" t="t" l="l"/>
+                <a:pathLst>
+                  <a:path h="2498572" w="4434291">
+                    <a:moveTo>
+                      <a:pt x="0" y="0"/>
+                    </a:moveTo>
+                    <a:lnTo>
+                      <a:pt x="4434291" y="0"/>
+                    </a:lnTo>
+                    <a:lnTo>
+                      <a:pt x="4434291" y="2498572"/>
+                    </a:lnTo>
+                    <a:lnTo>
+                      <a:pt x="0" y="2498572"/>
+                    </a:lnTo>
+                    <a:close/>
+                  </a:path>
+                </a:pathLst>
+              </a:custGeom>
               <a:solidFill>
-                <a:srgbClr val="4E5586"/>
+                <a:srgbClr val="FFFFFF"/>
               </a:solidFill>
-              <a:prstDash val="solid"/>
-              <a:miter/>
-            </a:ln>
-          </p:spPr>
-        </p:sp>
-        <p:sp>
-          <p:nvSpPr>
-            <p:cNvPr name="TextBox 7" id="7"/>
-            <p:cNvSpPr txBox="true"/>
-            <p:nvPr/>
-          </p:nvSpPr>
-          <p:spPr>
-            <a:xfrm>
-              <a:off x="0" y="-38100"/>
-              <a:ext cx="4434291" cy="2536672"/>
-            </a:xfrm>
-            <a:prstGeom prst="rect">
-              <a:avLst/>
-            </a:prstGeom>
-          </p:spPr>
-          <p:txBody>
-            <a:bodyPr anchor="ctr" rtlCol="false" tIns="50800" lIns="50800" bIns="50800" rIns="50800"/>
-            <a:lstStyle/>
-            <a:p>
-              <a:pPr algn="ctr">
-                <a:lnSpc>
-                  <a:spcPts val="2659"/>
-                </a:lnSpc>
-                <a:spcBef>
-                  <a:spcPct val="0"/>
-                </a:spcBef>
-              </a:pPr>
-            </a:p>
-          </p:txBody>
-        </p:sp>
-      </p:grpSp>
-      <p:grpSp>
-        <p:nvGrpSpPr>
-          <p:cNvPr name="Group 8" id="8"/>
-          <p:cNvGrpSpPr/>
-          <p:nvPr/>
-        </p:nvGrpSpPr>
-        <p:grpSpPr>
-          <a:xfrm rot="0">
-            <a:off x="1269569" y="1181100"/>
-            <a:ext cx="15818281" cy="7780780"/>
-            <a:chOff x="0" y="0"/>
-            <a:chExt cx="21091042" cy="10374373"/>
-          </a:xfrm>
-        </p:grpSpPr>
+              <a:ln w="238125" cap="sq">
+                <a:solidFill>
+                  <a:srgbClr val="4E5586"/>
+                </a:solidFill>
+                <a:prstDash val="solid"/>
+                <a:miter/>
+              </a:ln>
+            </p:spPr>
+          </p:sp>
+          <p:sp>
+            <p:nvSpPr>
+              <p:cNvPr name="TextBox 8" id="8"/>
+              <p:cNvSpPr txBox="true"/>
+              <p:nvPr/>
+            </p:nvSpPr>
+            <p:spPr>
+              <a:xfrm>
+                <a:off x="0" y="-38100"/>
+                <a:ext cx="4434291" cy="2536672"/>
+              </a:xfrm>
+              <a:prstGeom prst="rect">
+                <a:avLst/>
+              </a:prstGeom>
+            </p:spPr>
+            <p:txBody>
+              <a:bodyPr anchor="ctr" rtlCol="false" tIns="50800" lIns="50800" bIns="50800" rIns="50800"/>
+              <a:lstStyle/>
+              <a:p>
+                <a:pPr algn="ctr">
+                  <a:lnSpc>
+                    <a:spcPts val="2659"/>
+                  </a:lnSpc>
+                  <a:spcBef>
+                    <a:spcPct val="0"/>
+                  </a:spcBef>
+                </a:pPr>
+              </a:p>
+            </p:txBody>
+          </p:sp>
+        </p:grpSp>
         <p:sp>
           <p:nvSpPr>
             <p:cNvPr name="Freeform 9" id="9"/>
@@ -6215,7 +6862,7 @@
           </p:nvSpPr>
           <p:spPr>
             <a:xfrm flipH="false" flipV="false" rot="0">
-              <a:off x="15010684" y="0"/>
+              <a:off x="15888142" y="1041310"/>
               <a:ext cx="6080358" cy="7286768"/>
             </a:xfrm>
             <a:custGeom>
@@ -6230,13 +6877,13 @@
                     <a:pt x="0" y="0"/>
                   </a:moveTo>
                   <a:lnTo>
-                    <a:pt x="6080358" y="0"/>
+                    <a:pt x="6080357" y="0"/>
                   </a:lnTo>
                   <a:lnTo>
-                    <a:pt x="6080358" y="7286768"/>
+                    <a:pt x="6080357" y="7286767"/>
                   </a:lnTo>
                   <a:lnTo>
-                    <a:pt x="0" y="7286768"/>
+                    <a:pt x="0" y="7286767"/>
                   </a:lnTo>
                   <a:lnTo>
                     <a:pt x="0" y="0"/>
@@ -6267,7 +6914,7 @@
           </p:nvSpPr>
           <p:spPr>
             <a:xfrm flipH="false" flipV="false" rot="0">
-              <a:off x="9809162" y="4324276"/>
+              <a:off x="10686619" y="5365586"/>
               <a:ext cx="3410530" cy="6050097"/>
             </a:xfrm>
             <a:custGeom>
@@ -6282,10 +6929,10 @@
                     <a:pt x="0" y="0"/>
                   </a:moveTo>
                   <a:lnTo>
-                    <a:pt x="3410529" y="0"/>
+                    <a:pt x="3410530" y="0"/>
                   </a:lnTo>
                   <a:lnTo>
-                    <a:pt x="3410529" y="6050097"/>
+                    <a:pt x="3410530" y="6050097"/>
                   </a:lnTo>
                   <a:lnTo>
                     <a:pt x="0" y="6050097"/>
@@ -6319,7 +6966,7 @@
           </p:nvSpPr>
           <p:spPr>
             <a:xfrm flipH="false" flipV="false" rot="0">
-              <a:off x="3878728" y="766785"/>
+              <a:off x="4756186" y="1808095"/>
               <a:ext cx="4482341" cy="5753197"/>
             </a:xfrm>
             <a:custGeom>
@@ -6334,10 +6981,10 @@
                     <a:pt x="0" y="0"/>
                   </a:moveTo>
                   <a:lnTo>
-                    <a:pt x="4482341" y="0"/>
+                    <a:pt x="4482340" y="0"/>
                   </a:lnTo>
                   <a:lnTo>
-                    <a:pt x="4482341" y="5753197"/>
+                    <a:pt x="4482340" y="5753197"/>
                   </a:lnTo>
                   <a:lnTo>
                     <a:pt x="0" y="5753197"/>
@@ -6371,7 +7018,7 @@
           </p:nvSpPr>
           <p:spPr>
             <a:xfrm flipH="false" flipV="false" rot="0">
-              <a:off x="373003" y="4324276"/>
+              <a:off x="1250461" y="5365586"/>
               <a:ext cx="3454924" cy="5987540"/>
             </a:xfrm>
             <a:custGeom>
@@ -6423,7 +7070,7 @@
           </p:nvSpPr>
           <p:spPr>
             <a:xfrm rot="0">
-              <a:off x="0" y="2497442"/>
+              <a:off x="877458" y="3538751"/>
               <a:ext cx="4048531" cy="1814134"/>
             </a:xfrm>
             <a:prstGeom prst="rect">
@@ -6468,7 +7115,7 @@
           </p:nvSpPr>
           <p:spPr>
             <a:xfrm rot="0">
-              <a:off x="4503037" y="6755372"/>
+              <a:off x="5380495" y="7796682"/>
               <a:ext cx="4048531" cy="2432783"/>
             </a:xfrm>
             <a:prstGeom prst="rect">
@@ -6513,7 +7160,7 @@
           </p:nvSpPr>
           <p:spPr>
             <a:xfrm rot="0">
-              <a:off x="9464761" y="1444563"/>
+              <a:off x="10342218" y="2485872"/>
               <a:ext cx="4048531" cy="2432783"/>
             </a:xfrm>
             <a:prstGeom prst="rect">
@@ -6558,7 +7205,7 @@
           </p:nvSpPr>
           <p:spPr>
             <a:xfrm rot="0">
-              <a:off x="15290084" y="7466800"/>
+              <a:off x="16167542" y="8508109"/>
               <a:ext cx="4048531" cy="576836"/>
             </a:xfrm>
             <a:prstGeom prst="rect">
@@ -6595,165 +7242,82 @@
             </a:p>
           </p:txBody>
         </p:sp>
+        <p:sp>
+          <p:nvSpPr>
+            <p:cNvPr name="TextBox 17" id="17"/>
+            <p:cNvSpPr txBox="true"/>
+            <p:nvPr/>
+          </p:nvSpPr>
+          <p:spPr>
+            <a:xfrm rot="0">
+              <a:off x="17799451" y="11440374"/>
+              <a:ext cx="4649148" cy="674397"/>
+            </a:xfrm>
+            <a:prstGeom prst="rect">
+              <a:avLst/>
+            </a:prstGeom>
+          </p:spPr>
+          <p:txBody>
+            <a:bodyPr anchor="t" rtlCol="false" tIns="0" lIns="0" bIns="0" rIns="0">
+              <a:spAutoFit/>
+            </a:bodyPr>
+            <a:lstStyle/>
+            <a:p>
+              <a:pPr algn="ctr" rtl="true">
+                <a:lnSpc>
+                  <a:spcPts val="4245"/>
+                </a:lnSpc>
+                <a:spcBef>
+                  <a:spcPct val="0"/>
+                </a:spcBef>
+              </a:pPr>
+              <a:r>
+                <a:rPr lang="ar-EG" b="true" sz="3032">
+                  <a:solidFill>
+                    <a:srgbClr val="000000"/>
+                  </a:solidFill>
+                  <a:latin typeface="Markazi Text Bold"/>
+                  <a:ea typeface="Markazi Text Bold"/>
+                  <a:cs typeface="Markazi Text Bold"/>
+                  <a:sym typeface="Markazi Text Bold"/>
+                  <a:rtl val="true"/>
+                </a:rPr>
+                <a:t>صفحة </a:t>
+              </a:r>
+              <a:r>
+                <a:rPr lang="en-US" b="true" sz="3032">
+                  <a:solidFill>
+                    <a:srgbClr val="000000"/>
+                  </a:solidFill>
+                  <a:latin typeface="Markazi Text Bold"/>
+                  <a:ea typeface="Markazi Text Bold"/>
+                  <a:cs typeface="Markazi Text Bold"/>
+                  <a:sym typeface="Markazi Text Bold"/>
+                </a:rPr>
+                <a:t>44</a:t>
+              </a:r>
+              <a:r>
+                <a:rPr lang="ar-EG" b="true" sz="3032">
+                  <a:solidFill>
+                    <a:srgbClr val="000000"/>
+                  </a:solidFill>
+                  <a:latin typeface="Markazi Text Bold"/>
+                  <a:ea typeface="Markazi Text Bold"/>
+                  <a:cs typeface="Markazi Text Bold"/>
+                  <a:sym typeface="Markazi Text Bold"/>
+                  <a:rtl val="true"/>
+                </a:rPr>
+                <a:t> في الكتاب.</a:t>
+              </a:r>
+            </a:p>
+          </p:txBody>
+        </p:sp>
       </p:grpSp>
-      <p:sp>
-        <p:nvSpPr>
-          <p:cNvPr name="TextBox 17" id="17"/>
-          <p:cNvSpPr txBox="true"/>
-          <p:nvPr/>
-        </p:nvSpPr>
-        <p:spPr>
-          <a:xfrm rot="0">
-            <a:off x="13961064" y="8963729"/>
-            <a:ext cx="3486861" cy="522466"/>
-          </a:xfrm>
-          <a:prstGeom prst="rect">
-            <a:avLst/>
-          </a:prstGeom>
-        </p:spPr>
-        <p:txBody>
-          <a:bodyPr anchor="t" rtlCol="false" tIns="0" lIns="0" bIns="0" rIns="0">
-            <a:spAutoFit/>
-          </a:bodyPr>
-          <a:lstStyle/>
-          <a:p>
-            <a:pPr algn="ctr" rtl="true">
-              <a:lnSpc>
-                <a:spcPts val="4245"/>
-              </a:lnSpc>
-              <a:spcBef>
-                <a:spcPct val="0"/>
-              </a:spcBef>
-            </a:pPr>
-            <a:r>
-              <a:rPr lang="ar-EG" b="true" sz="3032">
-                <a:solidFill>
-                  <a:srgbClr val="000000"/>
-                </a:solidFill>
-                <a:latin typeface="Markazi Text Bold"/>
-                <a:ea typeface="Markazi Text Bold"/>
-                <a:cs typeface="Markazi Text Bold"/>
-                <a:sym typeface="Markazi Text Bold"/>
-                <a:rtl val="true"/>
-              </a:rPr>
-              <a:t>صفحة </a:t>
-            </a:r>
-            <a:r>
-              <a:rPr lang="en-US" b="true" sz="3032">
-                <a:solidFill>
-                  <a:srgbClr val="000000"/>
-                </a:solidFill>
-                <a:latin typeface="Markazi Text Bold"/>
-                <a:ea typeface="Markazi Text Bold"/>
-                <a:cs typeface="Markazi Text Bold"/>
-                <a:sym typeface="Markazi Text Bold"/>
-              </a:rPr>
-              <a:t>44</a:t>
-            </a:r>
-            <a:r>
-              <a:rPr lang="ar-EG" b="true" sz="3032">
-                <a:solidFill>
-                  <a:srgbClr val="000000"/>
-                </a:solidFill>
-                <a:latin typeface="Markazi Text Bold"/>
-                <a:ea typeface="Markazi Text Bold"/>
-                <a:cs typeface="Markazi Text Bold"/>
-                <a:sym typeface="Markazi Text Bold"/>
-                <a:rtl val="true"/>
-              </a:rPr>
-              <a:t> في الكتاب.</a:t>
-            </a:r>
-          </a:p>
-        </p:txBody>
-      </p:sp>
     </p:spTree>
   </p:cSld>
   <p:clrMapOvr>
     <a:masterClrMapping/>
   </p:clrMapOvr>
-  <p:transition spd="fast">
-    <p:push dir="l"/>
-  </p:transition>
-</p:sld>
-</file>
-
-<file path=ppt/slides/slide5.xml><?xml version="1.0" encoding="utf-8"?>
-<p:sld xmlns:p="http://schemas.openxmlformats.org/presentationml/2006/main" xmlns:a="http://schemas.openxmlformats.org/drawingml/2006/main" xmlns:r="http://schemas.openxmlformats.org/officeDocument/2006/relationships">
-  <p:cSld>
-    <p:spTree>
-      <p:nvGrpSpPr>
-        <p:cNvPr id="1" name=""/>
-        <p:cNvGrpSpPr/>
-        <p:nvPr/>
-      </p:nvGrpSpPr>
-      <p:grpSpPr>
-        <a:xfrm>
-          <a:off x="0" y="0"/>
-          <a:ext cx="0" cy="0"/>
-          <a:chOff x="0" y="0"/>
-          <a:chExt cx="0" cy="0"/>
-        </a:xfrm>
-      </p:grpSpPr>
-      <p:sp>
-        <p:nvSpPr>
-          <p:cNvPr name="Freeform 2" id="2"/>
-          <p:cNvSpPr/>
-          <p:nvPr/>
-        </p:nvSpPr>
-        <p:spPr>
-          <a:xfrm flipH="false" flipV="false" rot="0">
-            <a:off x="490151" y="32702"/>
-            <a:ext cx="17345797" cy="10010659"/>
-          </a:xfrm>
-          <a:custGeom>
-            <a:avLst/>
-            <a:gdLst/>
-            <a:ahLst/>
-            <a:cxnLst/>
-            <a:rect r="r" b="b" t="t" l="l"/>
-            <a:pathLst>
-              <a:path h="10010659" w="17345797">
-                <a:moveTo>
-                  <a:pt x="0" y="0"/>
-                </a:moveTo>
-                <a:lnTo>
-                  <a:pt x="17345798" y="0"/>
-                </a:lnTo>
-                <a:lnTo>
-                  <a:pt x="17345798" y="10010659"/>
-                </a:lnTo>
-                <a:lnTo>
-                  <a:pt x="0" y="10010659"/>
-                </a:lnTo>
-                <a:lnTo>
-                  <a:pt x="0" y="0"/>
-                </a:lnTo>
-                <a:close/>
-              </a:path>
-            </a:pathLst>
-          </a:custGeom>
-          <a:blipFill>
-            <a:blip r:embed="rId2">
-              <a:extLst>
-                <a:ext uri="{96DAC541-7B7A-43D3-8B79-37D633B846F1}">
-                  <asvg:svgBlip xmlns:asvg="http://schemas.microsoft.com/office/drawing/2016/SVG/main" r:embed="rId3"/>
-                </a:ext>
-              </a:extLst>
-            </a:blip>
-            <a:stretch>
-              <a:fillRect l="0" t="0" r="0" b="0"/>
-            </a:stretch>
-          </a:blipFill>
-        </p:spPr>
-      </p:sp>
-    </p:spTree>
-  </p:cSld>
-  <p:clrMapOvr>
-    <a:masterClrMapping/>
-  </p:clrMapOvr>
-  <p:transition spd="fast">
-    <p:push dir="l"/>
-  </p:transition>
 </p:sld>
 </file>
 
@@ -6782,8 +7346,8 @@
         </p:nvSpPr>
         <p:spPr>
           <a:xfrm flipH="false" flipV="false" rot="0">
-            <a:off x="490151" y="166745"/>
-            <a:ext cx="17387158" cy="10034530"/>
+            <a:off x="245076" y="-13488"/>
+            <a:ext cx="17835949" cy="10300488"/>
           </a:xfrm>
           <a:custGeom>
             <a:avLst/>
@@ -6792,18 +7356,18 @@
             <a:cxnLst/>
             <a:rect r="r" b="b" t="t" l="l"/>
             <a:pathLst>
-              <a:path h="10034530" w="17387158">
+              <a:path h="10300488" w="17835949">
                 <a:moveTo>
                   <a:pt x="0" y="0"/>
                 </a:moveTo>
                 <a:lnTo>
-                  <a:pt x="17387158" y="0"/>
-                </a:lnTo>
-                <a:lnTo>
-                  <a:pt x="17387158" y="10034530"/>
-                </a:lnTo>
-                <a:lnTo>
-                  <a:pt x="0" y="10034530"/>
+                  <a:pt x="17835948" y="0"/>
+                </a:lnTo>
+                <a:lnTo>
+                  <a:pt x="17835948" y="10300488"/>
+                </a:lnTo>
+                <a:lnTo>
+                  <a:pt x="0" y="10300488"/>
                 </a:lnTo>
                 <a:lnTo>
                   <a:pt x="0" y="0"/>
@@ -6831,9 +7395,6 @@
   <p:clrMapOvr>
     <a:masterClrMapping/>
   </p:clrMapOvr>
-  <p:transition spd="fast">
-    <p:push dir="l"/>
-  </p:transition>
 </p:sld>
 </file>
 
@@ -6862,8 +7423,8 @@
         </p:nvSpPr>
         <p:spPr>
           <a:xfrm flipH="false" flipV="false" rot="0">
-            <a:off x="490151" y="166745"/>
-            <a:ext cx="17387158" cy="10034530"/>
+            <a:off x="343922" y="-9525"/>
+            <a:ext cx="17664155" cy="10201275"/>
           </a:xfrm>
           <a:custGeom>
             <a:avLst/>
@@ -6872,18 +7433,18 @@
             <a:cxnLst/>
             <a:rect r="r" b="b" t="t" l="l"/>
             <a:pathLst>
-              <a:path h="10034530" w="17387158">
+              <a:path h="10201275" w="17664155">
                 <a:moveTo>
                   <a:pt x="0" y="0"/>
                 </a:moveTo>
                 <a:lnTo>
-                  <a:pt x="17387158" y="0"/>
-                </a:lnTo>
-                <a:lnTo>
-                  <a:pt x="17387158" y="10034530"/>
-                </a:lnTo>
-                <a:lnTo>
-                  <a:pt x="0" y="10034530"/>
+                  <a:pt x="17664154" y="0"/>
+                </a:lnTo>
+                <a:lnTo>
+                  <a:pt x="17664154" y="10201275"/>
+                </a:lnTo>
+                <a:lnTo>
+                  <a:pt x="0" y="10201275"/>
                 </a:lnTo>
                 <a:lnTo>
                   <a:pt x="0" y="0"/>
@@ -6906,119 +7467,11 @@
           </a:blipFill>
         </p:spPr>
       </p:sp>
-      <p:grpSp>
-        <p:nvGrpSpPr>
-          <p:cNvPr name="Group 3" id="3"/>
-          <p:cNvGrpSpPr/>
-          <p:nvPr/>
-        </p:nvGrpSpPr>
-        <p:grpSpPr>
-          <a:xfrm rot="0">
-            <a:off x="4988852" y="4149035"/>
-            <a:ext cx="137817" cy="283846"/>
-            <a:chOff x="0" y="0"/>
-            <a:chExt cx="36297" cy="74758"/>
-          </a:xfrm>
-        </p:grpSpPr>
-        <p:sp>
-          <p:nvSpPr>
-            <p:cNvPr name="Freeform 4" id="4"/>
-            <p:cNvSpPr/>
-            <p:nvPr/>
-          </p:nvSpPr>
-          <p:spPr>
-            <a:xfrm flipH="false" flipV="false" rot="0">
-              <a:off x="0" y="0"/>
-              <a:ext cx="36297" cy="74758"/>
-            </a:xfrm>
-            <a:custGeom>
-              <a:avLst/>
-              <a:gdLst/>
-              <a:ahLst/>
-              <a:cxnLst/>
-              <a:rect r="r" b="b" t="t" l="l"/>
-              <a:pathLst>
-                <a:path h="74758" w="36297">
-                  <a:moveTo>
-                    <a:pt x="18149" y="0"/>
-                  </a:moveTo>
-                  <a:lnTo>
-                    <a:pt x="18149" y="0"/>
-                  </a:lnTo>
-                  <a:cubicBezTo>
-                    <a:pt x="28172" y="0"/>
-                    <a:pt x="36297" y="8125"/>
-                    <a:pt x="36297" y="18149"/>
-                  </a:cubicBezTo>
-                  <a:lnTo>
-                    <a:pt x="36297" y="56609"/>
-                  </a:lnTo>
-                  <a:cubicBezTo>
-                    <a:pt x="36297" y="66632"/>
-                    <a:pt x="28172" y="74758"/>
-                    <a:pt x="18149" y="74758"/>
-                  </a:cubicBezTo>
-                  <a:lnTo>
-                    <a:pt x="18149" y="74758"/>
-                  </a:lnTo>
-                  <a:cubicBezTo>
-                    <a:pt x="8125" y="74758"/>
-                    <a:pt x="0" y="66632"/>
-                    <a:pt x="0" y="56609"/>
-                  </a:cubicBezTo>
-                  <a:lnTo>
-                    <a:pt x="0" y="18149"/>
-                  </a:lnTo>
-                  <a:cubicBezTo>
-                    <a:pt x="0" y="8125"/>
-                    <a:pt x="8125" y="0"/>
-                    <a:pt x="18149" y="0"/>
-                  </a:cubicBezTo>
-                  <a:close/>
-                </a:path>
-              </a:pathLst>
-            </a:custGeom>
-            <a:solidFill>
-              <a:srgbClr val="F3F3F6"/>
-            </a:solidFill>
-          </p:spPr>
-        </p:sp>
-        <p:sp>
-          <p:nvSpPr>
-            <p:cNvPr name="TextBox 5" id="5"/>
-            <p:cNvSpPr txBox="true"/>
-            <p:nvPr/>
-          </p:nvSpPr>
-          <p:spPr>
-            <a:xfrm>
-              <a:off x="0" y="-47625"/>
-              <a:ext cx="36297" cy="122383"/>
-            </a:xfrm>
-            <a:prstGeom prst="rect">
-              <a:avLst/>
-            </a:prstGeom>
-          </p:spPr>
-          <p:txBody>
-            <a:bodyPr anchor="ctr" rtlCol="false" tIns="50800" lIns="50800" bIns="50800" rIns="50800"/>
-            <a:lstStyle/>
-            <a:p>
-              <a:pPr algn="ctr">
-                <a:lnSpc>
-                  <a:spcPts val="3697"/>
-                </a:lnSpc>
-              </a:pPr>
-            </a:p>
-          </p:txBody>
-        </p:sp>
-      </p:grpSp>
     </p:spTree>
   </p:cSld>
   <p:clrMapOvr>
     <a:masterClrMapping/>
   </p:clrMapOvr>
-  <p:transition spd="fast">
-    <p:push dir="l"/>
-  </p:transition>
 </p:sld>
 </file>
 
@@ -7047,8 +7500,8 @@
         </p:nvSpPr>
         <p:spPr>
           <a:xfrm flipH="false" flipV="false" rot="0">
-            <a:off x="490151" y="166745"/>
-            <a:ext cx="17387158" cy="10034530"/>
+            <a:off x="245076" y="-28575"/>
+            <a:ext cx="17797849" cy="10278485"/>
           </a:xfrm>
           <a:custGeom>
             <a:avLst/>
@@ -7057,18 +7510,18 @@
             <a:cxnLst/>
             <a:rect r="r" b="b" t="t" l="l"/>
             <a:pathLst>
-              <a:path h="10034530" w="17387158">
+              <a:path h="10278485" w="17797849">
                 <a:moveTo>
                   <a:pt x="0" y="0"/>
                 </a:moveTo>
                 <a:lnTo>
-                  <a:pt x="17387158" y="0"/>
-                </a:lnTo>
-                <a:lnTo>
-                  <a:pt x="17387158" y="10034530"/>
-                </a:lnTo>
-                <a:lnTo>
-                  <a:pt x="0" y="10034530"/>
+                  <a:pt x="17797848" y="0"/>
+                </a:lnTo>
+                <a:lnTo>
+                  <a:pt x="17797848" y="10278485"/>
+                </a:lnTo>
+                <a:lnTo>
+                  <a:pt x="0" y="10278485"/>
                 </a:lnTo>
                 <a:lnTo>
                   <a:pt x="0" y="0"/>
@@ -7096,9 +7549,6 @@
   <p:clrMapOvr>
     <a:masterClrMapping/>
   </p:clrMapOvr>
-  <p:transition spd="fast">
-    <p:push dir="l"/>
-  </p:transition>
 </p:sld>
 </file>
 
@@ -7127,8 +7577,8 @@
         </p:nvSpPr>
         <p:spPr>
           <a:xfrm flipH="false" flipV="false" rot="0">
-            <a:off x="490151" y="166745"/>
-            <a:ext cx="17387158" cy="10034530"/>
+            <a:off x="284806" y="18040"/>
+            <a:ext cx="17797849" cy="10278485"/>
           </a:xfrm>
           <a:custGeom>
             <a:avLst/>
@@ -7137,18 +7587,18 @@
             <a:cxnLst/>
             <a:rect r="r" b="b" t="t" l="l"/>
             <a:pathLst>
-              <a:path h="10034530" w="17387158">
+              <a:path h="10278485" w="17797849">
                 <a:moveTo>
                   <a:pt x="0" y="0"/>
                 </a:moveTo>
                 <a:lnTo>
-                  <a:pt x="17387158" y="0"/>
-                </a:lnTo>
-                <a:lnTo>
-                  <a:pt x="17387158" y="10034530"/>
-                </a:lnTo>
-                <a:lnTo>
-                  <a:pt x="0" y="10034530"/>
+                  <a:pt x="17797849" y="0"/>
+                </a:lnTo>
+                <a:lnTo>
+                  <a:pt x="17797849" y="10278485"/>
+                </a:lnTo>
+                <a:lnTo>
+                  <a:pt x="0" y="10278485"/>
                 </a:lnTo>
                 <a:lnTo>
                   <a:pt x="0" y="0"/>
@@ -7176,9 +7626,6 @@
   <p:clrMapOvr>
     <a:masterClrMapping/>
   </p:clrMapOvr>
-  <p:transition spd="fast">
-    <p:push dir="l"/>
-  </p:transition>
 </p:sld>
 </file>
 

</xml_diff>